<commit_message>
5 June 2023 Java Programs
</commit_message>
<xml_diff>
--- a/src/test/resources/Materials/Selenium with java.pptx
+++ b/src/test/resources/Materials/Selenium with java.pptx
@@ -284,7 +284,7 @@
           <a:p>
             <a:fld id="{8070D441-BA38-4C28-9903-19044B422BA6}" type="datetimeFigureOut">
               <a:rPr lang="en-IN" smtClean="0"/>
-              <a:t>08-03-2022</a:t>
+              <a:t>23-05-2023</a:t>
             </a:fld>
             <a:endParaRPr lang="en-IN"/>
           </a:p>
@@ -484,7 +484,7 @@
           <a:p>
             <a:fld id="{8070D441-BA38-4C28-9903-19044B422BA6}" type="datetimeFigureOut">
               <a:rPr lang="en-IN" smtClean="0"/>
-              <a:t>08-03-2022</a:t>
+              <a:t>23-05-2023</a:t>
             </a:fld>
             <a:endParaRPr lang="en-IN"/>
           </a:p>
@@ -694,7 +694,7 @@
           <a:p>
             <a:fld id="{8070D441-BA38-4C28-9903-19044B422BA6}" type="datetimeFigureOut">
               <a:rPr lang="en-IN" smtClean="0"/>
-              <a:t>08-03-2022</a:t>
+              <a:t>23-05-2023</a:t>
             </a:fld>
             <a:endParaRPr lang="en-IN"/>
           </a:p>
@@ -894,7 +894,7 @@
           <a:p>
             <a:fld id="{8070D441-BA38-4C28-9903-19044B422BA6}" type="datetimeFigureOut">
               <a:rPr lang="en-IN" smtClean="0"/>
-              <a:t>08-03-2022</a:t>
+              <a:t>23-05-2023</a:t>
             </a:fld>
             <a:endParaRPr lang="en-IN"/>
           </a:p>
@@ -1170,7 +1170,7 @@
           <a:p>
             <a:fld id="{8070D441-BA38-4C28-9903-19044B422BA6}" type="datetimeFigureOut">
               <a:rPr lang="en-IN" smtClean="0"/>
-              <a:t>08-03-2022</a:t>
+              <a:t>23-05-2023</a:t>
             </a:fld>
             <a:endParaRPr lang="en-IN"/>
           </a:p>
@@ -1438,7 +1438,7 @@
           <a:p>
             <a:fld id="{8070D441-BA38-4C28-9903-19044B422BA6}" type="datetimeFigureOut">
               <a:rPr lang="en-IN" smtClean="0"/>
-              <a:t>08-03-2022</a:t>
+              <a:t>23-05-2023</a:t>
             </a:fld>
             <a:endParaRPr lang="en-IN"/>
           </a:p>
@@ -1853,7 +1853,7 @@
           <a:p>
             <a:fld id="{8070D441-BA38-4C28-9903-19044B422BA6}" type="datetimeFigureOut">
               <a:rPr lang="en-IN" smtClean="0"/>
-              <a:t>08-03-2022</a:t>
+              <a:t>23-05-2023</a:t>
             </a:fld>
             <a:endParaRPr lang="en-IN"/>
           </a:p>
@@ -1995,7 +1995,7 @@
           <a:p>
             <a:fld id="{8070D441-BA38-4C28-9903-19044B422BA6}" type="datetimeFigureOut">
               <a:rPr lang="en-IN" smtClean="0"/>
-              <a:t>08-03-2022</a:t>
+              <a:t>23-05-2023</a:t>
             </a:fld>
             <a:endParaRPr lang="en-IN"/>
           </a:p>
@@ -2108,7 +2108,7 @@
           <a:p>
             <a:fld id="{8070D441-BA38-4C28-9903-19044B422BA6}" type="datetimeFigureOut">
               <a:rPr lang="en-IN" smtClean="0"/>
-              <a:t>08-03-2022</a:t>
+              <a:t>23-05-2023</a:t>
             </a:fld>
             <a:endParaRPr lang="en-IN"/>
           </a:p>
@@ -2421,7 +2421,7 @@
           <a:p>
             <a:fld id="{8070D441-BA38-4C28-9903-19044B422BA6}" type="datetimeFigureOut">
               <a:rPr lang="en-IN" smtClean="0"/>
-              <a:t>08-03-2022</a:t>
+              <a:t>23-05-2023</a:t>
             </a:fld>
             <a:endParaRPr lang="en-IN"/>
           </a:p>
@@ -2710,7 +2710,7 @@
           <a:p>
             <a:fld id="{8070D441-BA38-4C28-9903-19044B422BA6}" type="datetimeFigureOut">
               <a:rPr lang="en-IN" smtClean="0"/>
-              <a:t>08-03-2022</a:t>
+              <a:t>23-05-2023</a:t>
             </a:fld>
             <a:endParaRPr lang="en-IN"/>
           </a:p>
@@ -2953,7 +2953,7 @@
           <a:p>
             <a:fld id="{8070D441-BA38-4C28-9903-19044B422BA6}" type="datetimeFigureOut">
               <a:rPr lang="en-IN" smtClean="0"/>
-              <a:t>08-03-2022</a:t>
+              <a:t>23-05-2023</a:t>
             </a:fld>
             <a:endParaRPr lang="en-IN"/>
           </a:p>
@@ -3430,11 +3430,15 @@
               <a:rPr lang="en-IN" sz="2000" dirty="0"/>
             </a:br>
             <a:br>
+              <a:rPr lang="en-IN" sz="3100"/>
+            </a:br>
+            <a:r>
+              <a:rPr lang="en-IN" sz="3100"/>
+              <a:t>9 </a:t>
+            </a:r>
+            <a:r>
               <a:rPr lang="en-IN" sz="3100" dirty="0"/>
-            </a:br>
-            <a:r>
-              <a:rPr lang="en-IN" sz="3100" dirty="0"/>
-              <a:t>8 plus years of experience in IT in Manual and Automation Testing in Banking, Financial and Telecom Domain </a:t>
+              <a:t>plus years of experience in IT in Manual and Automation Testing in Banking, Financial and Telecom Domain </a:t>
             </a:r>
             <a:br>
               <a:rPr lang="en-IN" sz="3100" dirty="0"/>

</xml_diff>